<commit_message>
KIWI_UI프로토타이핑.pptx, pdf KIWI_Usecase Diagram & DataBase Modeling.pptx, pdf
</commit_message>
<xml_diff>
--- a/KIWI_UI프로토타이핑.pptx
+++ b/KIWI_UI프로토타이핑.pptx
@@ -218,7 +218,7 @@
             <a:fld id="{AF5F354C-985F-48D7-B2BB-1B1A61EADE86}" type="datetimeFigureOut">
               <a:rPr lang="ko-KR" altLang="en-US" smtClean="0"/>
               <a:pPr/>
-              <a:t>2016-07-01</a:t>
+              <a:t>2016-07-02</a:t>
             </a:fld>
             <a:endParaRPr lang="ko-KR" altLang="en-US"/>
           </a:p>
@@ -6010,7 +6010,12 @@
             <p:ph type="subTitle" idx="1"/>
           </p:nvPr>
         </p:nvSpPr>
-        <p:spPr/>
+        <p:spPr>
+          <a:xfrm>
+            <a:off x="2087724" y="4509120"/>
+            <a:ext cx="4968552" cy="1129680"/>
+          </a:xfrm>
+        </p:spPr>
         <p:txBody>
           <a:bodyPr/>
           <a:lstStyle/>

</xml_diff>